<commit_message>
Edit Architectural Design diagram
</commit_message>
<xml_diff>
--- a/Documents/Architectural Presentation.pptx
+++ b/Documents/Architectural Presentation.pptx
@@ -5651,7 +5651,7 @@
         <p:spPr/>
         <p:txBody>
           <a:bodyPr>
-            <a:normAutofit/>
+            <a:normAutofit lnSpcReduction="10000"/>
           </a:bodyPr>
           <a:lstStyle/>
           <a:p>
@@ -5675,7 +5675,6 @@
               <a:rPr lang="en-US" dirty="0" smtClean="0"/>
               <a:t>Input from user processed by algorithm for comparison against answers and then feedback</a:t>
             </a:r>
-            <a:endParaRPr lang="en-US" dirty="0" smtClean="0"/>
           </a:p>
           <a:p>
             <a:pPr>
@@ -5783,10 +5782,15 @@
             <p:ph idx="1"/>
           </p:nvPr>
         </p:nvSpPr>
-        <p:spPr/>
+        <p:spPr>
+          <a:xfrm>
+            <a:off x="1218883" y="1701797"/>
+            <a:ext cx="5027929" cy="4462272"/>
+          </a:xfrm>
+        </p:spPr>
         <p:txBody>
           <a:bodyPr>
-            <a:normAutofit fontScale="92500" lnSpcReduction="10000"/>
+            <a:normAutofit fontScale="62500" lnSpcReduction="20000"/>
           </a:bodyPr>
           <a:lstStyle/>
           <a:p>
@@ -5797,15 +5801,7 @@
             </a:pPr>
             <a:r>
               <a:rPr lang="en-US" dirty="0" smtClean="0"/>
-              <a:t>Our program </a:t>
-            </a:r>
-            <a:r>
-              <a:rPr lang="en-US" dirty="0" smtClean="0"/>
-              <a:t>naturally </a:t>
-            </a:r>
-            <a:r>
-              <a:rPr lang="en-US" dirty="0" smtClean="0"/>
-              <a:t>utilizes a layered structure; modules neighbor each other and use each others’ services.</a:t>
+              <a:t>Our program naturally utilizes a layered structure; modules neighbor each other and use each others’ services.</a:t>
             </a:r>
           </a:p>
           <a:p>
@@ -5832,6 +5828,132 @@
           </a:p>
         </p:txBody>
       </p:sp>
+      <p:pic>
+        <p:nvPicPr>
+          <p:cNvPr id="2" name="Picture 1"/>
+          <p:cNvPicPr>
+            <a:picLocks noChangeAspect="1"/>
+          </p:cNvPicPr>
+          <p:nvPr/>
+        </p:nvPicPr>
+        <p:blipFill>
+          <a:blip r:embed="rId2">
+            <a:extLst>
+              <a:ext uri="{BEBA8EAE-BF5A-486C-A8C5-ECC9F3942E4B}">
+                <a14:imgProps xmlns:a14="http://schemas.microsoft.com/office/drawing/2010/main">
+                  <a14:imgLayer r:embed="rId3">
+                    <a14:imgEffect>
+                      <a14:backgroundRemoval t="0" b="100000" l="0" r="100000">
+                        <a14:foregroundMark x1="5283" y1="4433" x2="94465" y2="4433"/>
+                        <a14:foregroundMark x1="52830" y1="21643" x2="93459" y2="44198"/>
+                        <a14:foregroundMark x1="3019" y1="55150" x2="94843" y2="94524"/>
+                        <a14:foregroundMark x1="32201" y1="58931" x2="93836" y2="60235"/>
+                        <a14:foregroundMark x1="5409" y1="48110" x2="87547" y2="49022"/>
+                        <a14:backgroundMark x1="1761" y1="10300" x2="46038" y2="10691"/>
+                        <a14:backgroundMark x1="53082" y1="12386" x2="99748" y2="10169"/>
+                        <a14:backgroundMark x1="44780" y1="50847" x2="50063" y2="50587"/>
+                      </a14:backgroundRemoval>
+                    </a14:imgEffect>
+                  </a14:imgLayer>
+                </a14:imgProps>
+              </a:ext>
+              <a:ext uri="{28A0092B-C50C-407E-A947-70E740481C1C}">
+                <a14:useLocalDpi xmlns:a14="http://schemas.microsoft.com/office/drawing/2010/main" val="0"/>
+              </a:ext>
+            </a:extLst>
+          </a:blip>
+          <a:stretch>
+            <a:fillRect/>
+          </a:stretch>
+        </p:blipFill>
+        <p:spPr>
+          <a:xfrm>
+            <a:off x="6551612" y="913890"/>
+            <a:ext cx="5212797" cy="5029200"/>
+          </a:xfrm>
+          <a:prstGeom prst="rect">
+            <a:avLst/>
+          </a:prstGeom>
+        </p:spPr>
+      </p:pic>
+      <p:cxnSp>
+        <p:nvCxnSpPr>
+          <p:cNvPr id="4" name="Straight Arrow Connector 3"/>
+          <p:cNvCxnSpPr/>
+          <p:nvPr/>
+        </p:nvCxnSpPr>
+        <p:spPr>
+          <a:xfrm>
+            <a:off x="9142412" y="1295400"/>
+            <a:ext cx="0" cy="304800"/>
+          </a:xfrm>
+          <a:prstGeom prst="straightConnector1">
+            <a:avLst/>
+          </a:prstGeom>
+          <a:ln w="25400">
+            <a:solidFill>
+              <a:schemeClr val="tx1">
+                <a:lumMod val="65000"/>
+              </a:schemeClr>
+            </a:solidFill>
+            <a:headEnd type="triangle"/>
+            <a:tailEnd type="triangle"/>
+          </a:ln>
+        </p:spPr>
+        <p:style>
+          <a:lnRef idx="1">
+            <a:schemeClr val="accent1"/>
+          </a:lnRef>
+          <a:fillRef idx="0">
+            <a:schemeClr val="accent1"/>
+          </a:fillRef>
+          <a:effectRef idx="0">
+            <a:schemeClr val="accent1"/>
+          </a:effectRef>
+          <a:fontRef idx="minor">
+            <a:schemeClr val="tx1"/>
+          </a:fontRef>
+        </p:style>
+      </p:cxnSp>
+      <p:cxnSp>
+        <p:nvCxnSpPr>
+          <p:cNvPr id="15" name="Straight Arrow Connector 14"/>
+          <p:cNvCxnSpPr/>
+          <p:nvPr/>
+        </p:nvCxnSpPr>
+        <p:spPr>
+          <a:xfrm flipH="1">
+            <a:off x="9133979" y="3365755"/>
+            <a:ext cx="3192" cy="304290"/>
+          </a:xfrm>
+          <a:prstGeom prst="straightConnector1">
+            <a:avLst/>
+          </a:prstGeom>
+          <a:ln w="25400">
+            <a:solidFill>
+              <a:schemeClr val="tx1">
+                <a:lumMod val="65000"/>
+              </a:schemeClr>
+            </a:solidFill>
+            <a:headEnd type="triangle"/>
+            <a:tailEnd type="triangle"/>
+          </a:ln>
+        </p:spPr>
+        <p:style>
+          <a:lnRef idx="1">
+            <a:schemeClr val="accent1"/>
+          </a:lnRef>
+          <a:fillRef idx="0">
+            <a:schemeClr val="accent1"/>
+          </a:fillRef>
+          <a:effectRef idx="0">
+            <a:schemeClr val="accent1"/>
+          </a:effectRef>
+          <a:fontRef idx="minor">
+            <a:schemeClr val="tx1"/>
+          </a:fontRef>
+        </p:style>
+      </p:cxnSp>
     </p:spTree>
     <p:extLst>
       <p:ext uri="{BB962C8B-B14F-4D97-AF65-F5344CB8AC3E}">
@@ -6949,139 +7071,12 @@
 </file>
 
 <file path=customXml/item1.xml><?xml version="1.0" encoding="utf-8"?>
-<p:properties xmlns:p="http://schemas.microsoft.com/office/2006/metadata/properties" xmlns:xsi="http://www.w3.org/2001/XMLSchema-instance" xmlns:pc="http://schemas.microsoft.com/office/infopath/2007/PartnerControls">
-  <documentManagement>
-    <LocPublishedLinkedAssetsLookup xmlns="4873beb7-5857-4685-be1f-d57550cc96cc" xsi:nil="true"/>
-    <ApprovalStatus xmlns="4873beb7-5857-4685-be1f-d57550cc96cc">InProgress</ApprovalStatus>
-    <MarketSpecific xmlns="4873beb7-5857-4685-be1f-d57550cc96cc">false</MarketSpecific>
-    <LocComments xmlns="4873beb7-5857-4685-be1f-d57550cc96cc" xsi:nil="true"/>
-    <LocLastLocAttemptVersionTypeLookup xmlns="4873beb7-5857-4685-be1f-d57550cc96cc" xsi:nil="true"/>
-    <DirectSourceMarket xmlns="4873beb7-5857-4685-be1f-d57550cc96cc" xsi:nil="true"/>
-    <ThumbnailAssetId xmlns="4873beb7-5857-4685-be1f-d57550cc96cc" xsi:nil="true"/>
-    <PrimaryImageGen xmlns="4873beb7-5857-4685-be1f-d57550cc96cc">false</PrimaryImageGen>
-    <LocNewPublishedVersionLookup xmlns="4873beb7-5857-4685-be1f-d57550cc96cc" xsi:nil="true"/>
-    <LegacyData xmlns="4873beb7-5857-4685-be1f-d57550cc96cc" xsi:nil="true"/>
-    <LocRecommendedHandoff xmlns="4873beb7-5857-4685-be1f-d57550cc96cc" xsi:nil="true"/>
-    <BusinessGroup xmlns="4873beb7-5857-4685-be1f-d57550cc96cc" xsi:nil="true"/>
-    <BlockPublish xmlns="4873beb7-5857-4685-be1f-d57550cc96cc">false</BlockPublish>
-    <TPFriendlyName xmlns="4873beb7-5857-4685-be1f-d57550cc96cc" xsi:nil="true"/>
-    <LocOverallPublishStatusLookup xmlns="4873beb7-5857-4685-be1f-d57550cc96cc" xsi:nil="true"/>
-    <NumericId xmlns="4873beb7-5857-4685-be1f-d57550cc96cc" xsi:nil="true"/>
-    <APEditor xmlns="4873beb7-5857-4685-be1f-d57550cc96cc">
-      <UserInfo>
-        <DisplayName/>
-        <AccountId xsi:nil="true"/>
-        <AccountType/>
-      </UserInfo>
-    </APEditor>
-    <SourceTitle xmlns="4873beb7-5857-4685-be1f-d57550cc96cc" xsi:nil="true"/>
-    <OpenTemplate xmlns="4873beb7-5857-4685-be1f-d57550cc96cc">true</OpenTemplate>
-    <LocOverallLocStatusLookup xmlns="4873beb7-5857-4685-be1f-d57550cc96cc" xsi:nil="true"/>
-    <UALocComments xmlns="4873beb7-5857-4685-be1f-d57550cc96cc" xsi:nil="true"/>
-    <ParentAssetId xmlns="4873beb7-5857-4685-be1f-d57550cc96cc" xsi:nil="true"/>
-    <IntlLangReviewDate xmlns="4873beb7-5857-4685-be1f-d57550cc96cc" xsi:nil="true"/>
-    <FeatureTagsTaxHTField0 xmlns="4873beb7-5857-4685-be1f-d57550cc96cc">
-      <Terms xmlns="http://schemas.microsoft.com/office/infopath/2007/PartnerControls"/>
-    </FeatureTagsTaxHTField0>
-    <PublishStatusLookup xmlns="4873beb7-5857-4685-be1f-d57550cc96cc">
-      <Value>1345093</Value>
-    </PublishStatusLookup>
-    <Providers xmlns="4873beb7-5857-4685-be1f-d57550cc96cc" xsi:nil="true"/>
-    <MachineTranslated xmlns="4873beb7-5857-4685-be1f-d57550cc96cc">false</MachineTranslated>
-    <OriginalSourceMarket xmlns="4873beb7-5857-4685-be1f-d57550cc96cc" xsi:nil="true"/>
-    <APDescription xmlns="4873beb7-5857-4685-be1f-d57550cc96cc">This simple template design works for technology and  businesses, but it's versatile enough to use in other contexts.  It features multiple slide layouts designed for widescreen (16x9 resolution) and includes a sample SmartArt list and chart that are easily editable.</APDescription>
-    <ClipArtFilename xmlns="4873beb7-5857-4685-be1f-d57550cc96cc" xsi:nil="true"/>
-    <ContentItem xmlns="4873beb7-5857-4685-be1f-d57550cc96cc" xsi:nil="true"/>
-    <TPInstallLocation xmlns="4873beb7-5857-4685-be1f-d57550cc96cc" xsi:nil="true"/>
-    <PublishTargets xmlns="4873beb7-5857-4685-be1f-d57550cc96cc">OfficeOnlineVNext</PublishTargets>
-    <TimesCloned xmlns="4873beb7-5857-4685-be1f-d57550cc96cc" xsi:nil="true"/>
-    <AssetStart xmlns="4873beb7-5857-4685-be1f-d57550cc96cc">2011-11-26T00:30:00+00:00</AssetStart>
-    <Provider xmlns="4873beb7-5857-4685-be1f-d57550cc96cc" xsi:nil="true"/>
-    <AcquiredFrom xmlns="4873beb7-5857-4685-be1f-d57550cc96cc">Internal MS</AcquiredFrom>
-    <FriendlyTitle xmlns="4873beb7-5857-4685-be1f-d57550cc96cc" xsi:nil="true"/>
-    <LastHandOff xmlns="4873beb7-5857-4685-be1f-d57550cc96cc" xsi:nil="true"/>
-    <TPClientViewer xmlns="4873beb7-5857-4685-be1f-d57550cc96cc" xsi:nil="true"/>
-    <TemplateStatus xmlns="4873beb7-5857-4685-be1f-d57550cc96cc">Complete</TemplateStatus>
-    <Downloads xmlns="4873beb7-5857-4685-be1f-d57550cc96cc">0</Downloads>
-    <OOCacheId xmlns="4873beb7-5857-4685-be1f-d57550cc96cc" xsi:nil="true"/>
-    <IsDeleted xmlns="4873beb7-5857-4685-be1f-d57550cc96cc">false</IsDeleted>
-    <LocPublishedDependentAssetsLookup xmlns="4873beb7-5857-4685-be1f-d57550cc96cc" xsi:nil="true"/>
-    <TPExecutable xmlns="4873beb7-5857-4685-be1f-d57550cc96cc" xsi:nil="true"/>
-    <EditorialTags xmlns="4873beb7-5857-4685-be1f-d57550cc96cc" xsi:nil="true"/>
-    <SubmitterId xmlns="4873beb7-5857-4685-be1f-d57550cc96cc" xsi:nil="true"/>
-    <ApprovalLog xmlns="4873beb7-5857-4685-be1f-d57550cc96cc" xsi:nil="true"/>
-    <AssetType xmlns="4873beb7-5857-4685-be1f-d57550cc96cc">TP</AssetType>
-    <BugNumber xmlns="4873beb7-5857-4685-be1f-d57550cc96cc" xsi:nil="true"/>
-    <CSXSubmissionDate xmlns="4873beb7-5857-4685-be1f-d57550cc96cc" xsi:nil="true"/>
-    <CSXUpdate xmlns="4873beb7-5857-4685-be1f-d57550cc96cc">false</CSXUpdate>
-    <Milestone xmlns="4873beb7-5857-4685-be1f-d57550cc96cc" xsi:nil="true"/>
-    <RecommendationsModifier xmlns="4873beb7-5857-4685-be1f-d57550cc96cc" xsi:nil="true"/>
-    <OriginAsset xmlns="4873beb7-5857-4685-be1f-d57550cc96cc" xsi:nil="true"/>
-    <TPComponent xmlns="4873beb7-5857-4685-be1f-d57550cc96cc" xsi:nil="true"/>
-    <AssetId xmlns="4873beb7-5857-4685-be1f-d57550cc96cc">TP102787989</AssetId>
-    <IntlLocPriority xmlns="4873beb7-5857-4685-be1f-d57550cc96cc" xsi:nil="true"/>
-    <PolicheckWords xmlns="4873beb7-5857-4685-be1f-d57550cc96cc" xsi:nil="true"/>
-    <TPLaunchHelpLink xmlns="4873beb7-5857-4685-be1f-d57550cc96cc" xsi:nil="true"/>
-    <TPApplication xmlns="4873beb7-5857-4685-be1f-d57550cc96cc" xsi:nil="true"/>
-    <CrawlForDependencies xmlns="4873beb7-5857-4685-be1f-d57550cc96cc">false</CrawlForDependencies>
-    <HandoffToMSDN xmlns="4873beb7-5857-4685-be1f-d57550cc96cc" xsi:nil="true"/>
-    <PlannedPubDate xmlns="4873beb7-5857-4685-be1f-d57550cc96cc" xsi:nil="true"/>
-    <IntlLangReviewer xmlns="4873beb7-5857-4685-be1f-d57550cc96cc" xsi:nil="true"/>
-    <TrustLevel xmlns="4873beb7-5857-4685-be1f-d57550cc96cc">1 Microsoft Managed Content</TrustLevel>
-    <LocLastLocAttemptVersionLookup xmlns="4873beb7-5857-4685-be1f-d57550cc96cc">694266</LocLastLocAttemptVersionLookup>
-    <LocProcessedForHandoffsLookup xmlns="4873beb7-5857-4685-be1f-d57550cc96cc" xsi:nil="true"/>
-    <IsSearchable xmlns="4873beb7-5857-4685-be1f-d57550cc96cc">true</IsSearchable>
-    <TemplateTemplateType xmlns="4873beb7-5857-4685-be1f-d57550cc96cc">PowerPoint Presentation Template</TemplateTemplateType>
-    <CampaignTagsTaxHTField0 xmlns="4873beb7-5857-4685-be1f-d57550cc96cc">
-      <Terms xmlns="http://schemas.microsoft.com/office/infopath/2007/PartnerControls"/>
-    </CampaignTagsTaxHTField0>
-    <TPNamespace xmlns="4873beb7-5857-4685-be1f-d57550cc96cc" xsi:nil="true"/>
-    <LocOverallPreviewStatusLookup xmlns="4873beb7-5857-4685-be1f-d57550cc96cc" xsi:nil="true"/>
-    <TaxCatchAll xmlns="4873beb7-5857-4685-be1f-d57550cc96cc"/>
-    <Markets xmlns="4873beb7-5857-4685-be1f-d57550cc96cc"/>
-    <UAProjectedTotalWords xmlns="4873beb7-5857-4685-be1f-d57550cc96cc" xsi:nil="true"/>
-    <IntlLangReview xmlns="4873beb7-5857-4685-be1f-d57550cc96cc" xsi:nil="true"/>
-    <OutputCachingOn xmlns="4873beb7-5857-4685-be1f-d57550cc96cc">false</OutputCachingOn>
-    <AverageRating xmlns="4873beb7-5857-4685-be1f-d57550cc96cc" xsi:nil="true"/>
-    <APAuthor xmlns="4873beb7-5857-4685-be1f-d57550cc96cc">
-      <UserInfo>
-        <DisplayName>REDMOND\kristaa</DisplayName>
-        <AccountId>136</AccountId>
-        <AccountType/>
-      </UserInfo>
-    </APAuthor>
-    <LocManualTestRequired xmlns="4873beb7-5857-4685-be1f-d57550cc96cc">false</LocManualTestRequired>
-    <TPCommandLine xmlns="4873beb7-5857-4685-be1f-d57550cc96cc" xsi:nil="true"/>
-    <TPAppVersion xmlns="4873beb7-5857-4685-be1f-d57550cc96cc" xsi:nil="true"/>
-    <EditorialStatus xmlns="4873beb7-5857-4685-be1f-d57550cc96cc">Complete</EditorialStatus>
-    <LastModifiedDateTime xmlns="4873beb7-5857-4685-be1f-d57550cc96cc" xsi:nil="true"/>
-    <ScenarioTagsTaxHTField0 xmlns="4873beb7-5857-4685-be1f-d57550cc96cc">
-      <Terms xmlns="http://schemas.microsoft.com/office/infopath/2007/PartnerControls"/>
-    </ScenarioTagsTaxHTField0>
-    <LocProcessedForMarketsLookup xmlns="4873beb7-5857-4685-be1f-d57550cc96cc" xsi:nil="true"/>
-    <TPLaunchHelpLinkType xmlns="4873beb7-5857-4685-be1f-d57550cc96cc">Template</TPLaunchHelpLinkType>
-    <OriginalRelease xmlns="4873beb7-5857-4685-be1f-d57550cc96cc">15</OriginalRelease>
-    <LocalizationTagsTaxHTField0 xmlns="4873beb7-5857-4685-be1f-d57550cc96cc">
-      <Terms xmlns="http://schemas.microsoft.com/office/infopath/2007/PartnerControls"/>
-    </LocalizationTagsTaxHTField0>
-    <UACurrentWords xmlns="4873beb7-5857-4685-be1f-d57550cc96cc" xsi:nil="true"/>
-    <ArtSampleDocs xmlns="4873beb7-5857-4685-be1f-d57550cc96cc" xsi:nil="true"/>
-    <UALocRecommendation xmlns="4873beb7-5857-4685-be1f-d57550cc96cc">Localize</UALocRecommendation>
-    <Manager xmlns="4873beb7-5857-4685-be1f-d57550cc96cc" xsi:nil="true"/>
-    <LocOverallHandbackStatusLookup xmlns="4873beb7-5857-4685-be1f-d57550cc96cc" xsi:nil="true"/>
-    <ShowIn xmlns="4873beb7-5857-4685-be1f-d57550cc96cc">Show everywhere</ShowIn>
-    <UANotes xmlns="4873beb7-5857-4685-be1f-d57550cc96cc" xsi:nil="true"/>
-    <InternalTagsTaxHTField0 xmlns="4873beb7-5857-4685-be1f-d57550cc96cc">
-      <Terms xmlns="http://schemas.microsoft.com/office/infopath/2007/PartnerControls"/>
-    </InternalTagsTaxHTField0>
-    <CSXHash xmlns="4873beb7-5857-4685-be1f-d57550cc96cc" xsi:nil="true"/>
-    <VoteCount xmlns="4873beb7-5857-4685-be1f-d57550cc96cc" xsi:nil="true"/>
-    <AssetExpire xmlns="4873beb7-5857-4685-be1f-d57550cc96cc">2029-05-12T07:00:00+00:00</AssetExpire>
-    <DSATActionTaken xmlns="4873beb7-5857-4685-be1f-d57550cc96cc" xsi:nil="true"/>
-    <CSXSubmissionMarket xmlns="4873beb7-5857-4685-be1f-d57550cc96cc" xsi:nil="true"/>
-    <LocMarketGroupTiers2 xmlns="4873beb7-5857-4685-be1f-d57550cc96cc" xsi:nil="true"/>
-  </documentManagement>
-</p:properties>
+<?mso-contentType ?>
+<FormTemplates xmlns="http://schemas.microsoft.com/sharepoint/v3/contenttype/forms">
+  <Display>DocumentLibraryForm</Display>
+  <Edit>AssetEditForm</Edit>
+  <New>DocumentLibraryForm</New>
+</FormTemplates>
 </file>
 
 <file path=customXml/item2.xml><?xml version="1.0" encoding="utf-8"?>
@@ -8125,26 +8120,145 @@
 </file>
 
 <file path=customXml/item3.xml><?xml version="1.0" encoding="utf-8"?>
-<?mso-contentType ?>
-<FormTemplates xmlns="http://schemas.microsoft.com/sharepoint/v3/contenttype/forms">
-  <Display>DocumentLibraryForm</Display>
-  <Edit>AssetEditForm</Edit>
-  <New>DocumentLibraryForm</New>
-</FormTemplates>
+<p:properties xmlns:p="http://schemas.microsoft.com/office/2006/metadata/properties" xmlns:xsi="http://www.w3.org/2001/XMLSchema-instance" xmlns:pc="http://schemas.microsoft.com/office/infopath/2007/PartnerControls">
+  <documentManagement>
+    <LocPublishedLinkedAssetsLookup xmlns="4873beb7-5857-4685-be1f-d57550cc96cc" xsi:nil="true"/>
+    <ApprovalStatus xmlns="4873beb7-5857-4685-be1f-d57550cc96cc">InProgress</ApprovalStatus>
+    <MarketSpecific xmlns="4873beb7-5857-4685-be1f-d57550cc96cc">false</MarketSpecific>
+    <LocComments xmlns="4873beb7-5857-4685-be1f-d57550cc96cc" xsi:nil="true"/>
+    <LocLastLocAttemptVersionTypeLookup xmlns="4873beb7-5857-4685-be1f-d57550cc96cc" xsi:nil="true"/>
+    <DirectSourceMarket xmlns="4873beb7-5857-4685-be1f-d57550cc96cc" xsi:nil="true"/>
+    <ThumbnailAssetId xmlns="4873beb7-5857-4685-be1f-d57550cc96cc" xsi:nil="true"/>
+    <PrimaryImageGen xmlns="4873beb7-5857-4685-be1f-d57550cc96cc">false</PrimaryImageGen>
+    <LocNewPublishedVersionLookup xmlns="4873beb7-5857-4685-be1f-d57550cc96cc" xsi:nil="true"/>
+    <LegacyData xmlns="4873beb7-5857-4685-be1f-d57550cc96cc" xsi:nil="true"/>
+    <LocRecommendedHandoff xmlns="4873beb7-5857-4685-be1f-d57550cc96cc" xsi:nil="true"/>
+    <BusinessGroup xmlns="4873beb7-5857-4685-be1f-d57550cc96cc" xsi:nil="true"/>
+    <BlockPublish xmlns="4873beb7-5857-4685-be1f-d57550cc96cc">false</BlockPublish>
+    <TPFriendlyName xmlns="4873beb7-5857-4685-be1f-d57550cc96cc" xsi:nil="true"/>
+    <LocOverallPublishStatusLookup xmlns="4873beb7-5857-4685-be1f-d57550cc96cc" xsi:nil="true"/>
+    <NumericId xmlns="4873beb7-5857-4685-be1f-d57550cc96cc" xsi:nil="true"/>
+    <APEditor xmlns="4873beb7-5857-4685-be1f-d57550cc96cc">
+      <UserInfo>
+        <DisplayName/>
+        <AccountId xsi:nil="true"/>
+        <AccountType/>
+      </UserInfo>
+    </APEditor>
+    <SourceTitle xmlns="4873beb7-5857-4685-be1f-d57550cc96cc" xsi:nil="true"/>
+    <OpenTemplate xmlns="4873beb7-5857-4685-be1f-d57550cc96cc">true</OpenTemplate>
+    <LocOverallLocStatusLookup xmlns="4873beb7-5857-4685-be1f-d57550cc96cc" xsi:nil="true"/>
+    <UALocComments xmlns="4873beb7-5857-4685-be1f-d57550cc96cc" xsi:nil="true"/>
+    <ParentAssetId xmlns="4873beb7-5857-4685-be1f-d57550cc96cc" xsi:nil="true"/>
+    <IntlLangReviewDate xmlns="4873beb7-5857-4685-be1f-d57550cc96cc" xsi:nil="true"/>
+    <FeatureTagsTaxHTField0 xmlns="4873beb7-5857-4685-be1f-d57550cc96cc">
+      <Terms xmlns="http://schemas.microsoft.com/office/infopath/2007/PartnerControls"/>
+    </FeatureTagsTaxHTField0>
+    <PublishStatusLookup xmlns="4873beb7-5857-4685-be1f-d57550cc96cc">
+      <Value>1345093</Value>
+    </PublishStatusLookup>
+    <Providers xmlns="4873beb7-5857-4685-be1f-d57550cc96cc" xsi:nil="true"/>
+    <MachineTranslated xmlns="4873beb7-5857-4685-be1f-d57550cc96cc">false</MachineTranslated>
+    <OriginalSourceMarket xmlns="4873beb7-5857-4685-be1f-d57550cc96cc" xsi:nil="true"/>
+    <APDescription xmlns="4873beb7-5857-4685-be1f-d57550cc96cc">This simple template design works for technology and  businesses, but it's versatile enough to use in other contexts.  It features multiple slide layouts designed for widescreen (16x9 resolution) and includes a sample SmartArt list and chart that are easily editable.</APDescription>
+    <ClipArtFilename xmlns="4873beb7-5857-4685-be1f-d57550cc96cc" xsi:nil="true"/>
+    <ContentItem xmlns="4873beb7-5857-4685-be1f-d57550cc96cc" xsi:nil="true"/>
+    <TPInstallLocation xmlns="4873beb7-5857-4685-be1f-d57550cc96cc" xsi:nil="true"/>
+    <PublishTargets xmlns="4873beb7-5857-4685-be1f-d57550cc96cc">OfficeOnlineVNext</PublishTargets>
+    <TimesCloned xmlns="4873beb7-5857-4685-be1f-d57550cc96cc" xsi:nil="true"/>
+    <AssetStart xmlns="4873beb7-5857-4685-be1f-d57550cc96cc">2011-11-26T00:30:00+00:00</AssetStart>
+    <Provider xmlns="4873beb7-5857-4685-be1f-d57550cc96cc" xsi:nil="true"/>
+    <AcquiredFrom xmlns="4873beb7-5857-4685-be1f-d57550cc96cc">Internal MS</AcquiredFrom>
+    <FriendlyTitle xmlns="4873beb7-5857-4685-be1f-d57550cc96cc" xsi:nil="true"/>
+    <LastHandOff xmlns="4873beb7-5857-4685-be1f-d57550cc96cc" xsi:nil="true"/>
+    <TPClientViewer xmlns="4873beb7-5857-4685-be1f-d57550cc96cc" xsi:nil="true"/>
+    <TemplateStatus xmlns="4873beb7-5857-4685-be1f-d57550cc96cc">Complete</TemplateStatus>
+    <Downloads xmlns="4873beb7-5857-4685-be1f-d57550cc96cc">0</Downloads>
+    <OOCacheId xmlns="4873beb7-5857-4685-be1f-d57550cc96cc" xsi:nil="true"/>
+    <IsDeleted xmlns="4873beb7-5857-4685-be1f-d57550cc96cc">false</IsDeleted>
+    <LocPublishedDependentAssetsLookup xmlns="4873beb7-5857-4685-be1f-d57550cc96cc" xsi:nil="true"/>
+    <TPExecutable xmlns="4873beb7-5857-4685-be1f-d57550cc96cc" xsi:nil="true"/>
+    <EditorialTags xmlns="4873beb7-5857-4685-be1f-d57550cc96cc" xsi:nil="true"/>
+    <SubmitterId xmlns="4873beb7-5857-4685-be1f-d57550cc96cc" xsi:nil="true"/>
+    <ApprovalLog xmlns="4873beb7-5857-4685-be1f-d57550cc96cc" xsi:nil="true"/>
+    <AssetType xmlns="4873beb7-5857-4685-be1f-d57550cc96cc">TP</AssetType>
+    <BugNumber xmlns="4873beb7-5857-4685-be1f-d57550cc96cc" xsi:nil="true"/>
+    <CSXSubmissionDate xmlns="4873beb7-5857-4685-be1f-d57550cc96cc" xsi:nil="true"/>
+    <CSXUpdate xmlns="4873beb7-5857-4685-be1f-d57550cc96cc">false</CSXUpdate>
+    <Milestone xmlns="4873beb7-5857-4685-be1f-d57550cc96cc" xsi:nil="true"/>
+    <RecommendationsModifier xmlns="4873beb7-5857-4685-be1f-d57550cc96cc" xsi:nil="true"/>
+    <OriginAsset xmlns="4873beb7-5857-4685-be1f-d57550cc96cc" xsi:nil="true"/>
+    <TPComponent xmlns="4873beb7-5857-4685-be1f-d57550cc96cc" xsi:nil="true"/>
+    <AssetId xmlns="4873beb7-5857-4685-be1f-d57550cc96cc">TP102787989</AssetId>
+    <IntlLocPriority xmlns="4873beb7-5857-4685-be1f-d57550cc96cc" xsi:nil="true"/>
+    <PolicheckWords xmlns="4873beb7-5857-4685-be1f-d57550cc96cc" xsi:nil="true"/>
+    <TPLaunchHelpLink xmlns="4873beb7-5857-4685-be1f-d57550cc96cc" xsi:nil="true"/>
+    <TPApplication xmlns="4873beb7-5857-4685-be1f-d57550cc96cc" xsi:nil="true"/>
+    <CrawlForDependencies xmlns="4873beb7-5857-4685-be1f-d57550cc96cc">false</CrawlForDependencies>
+    <HandoffToMSDN xmlns="4873beb7-5857-4685-be1f-d57550cc96cc" xsi:nil="true"/>
+    <PlannedPubDate xmlns="4873beb7-5857-4685-be1f-d57550cc96cc" xsi:nil="true"/>
+    <IntlLangReviewer xmlns="4873beb7-5857-4685-be1f-d57550cc96cc" xsi:nil="true"/>
+    <TrustLevel xmlns="4873beb7-5857-4685-be1f-d57550cc96cc">1 Microsoft Managed Content</TrustLevel>
+    <LocLastLocAttemptVersionLookup xmlns="4873beb7-5857-4685-be1f-d57550cc96cc">694266</LocLastLocAttemptVersionLookup>
+    <LocProcessedForHandoffsLookup xmlns="4873beb7-5857-4685-be1f-d57550cc96cc" xsi:nil="true"/>
+    <IsSearchable xmlns="4873beb7-5857-4685-be1f-d57550cc96cc">true</IsSearchable>
+    <TemplateTemplateType xmlns="4873beb7-5857-4685-be1f-d57550cc96cc">PowerPoint Presentation Template</TemplateTemplateType>
+    <CampaignTagsTaxHTField0 xmlns="4873beb7-5857-4685-be1f-d57550cc96cc">
+      <Terms xmlns="http://schemas.microsoft.com/office/infopath/2007/PartnerControls"/>
+    </CampaignTagsTaxHTField0>
+    <TPNamespace xmlns="4873beb7-5857-4685-be1f-d57550cc96cc" xsi:nil="true"/>
+    <LocOverallPreviewStatusLookup xmlns="4873beb7-5857-4685-be1f-d57550cc96cc" xsi:nil="true"/>
+    <TaxCatchAll xmlns="4873beb7-5857-4685-be1f-d57550cc96cc"/>
+    <Markets xmlns="4873beb7-5857-4685-be1f-d57550cc96cc"/>
+    <UAProjectedTotalWords xmlns="4873beb7-5857-4685-be1f-d57550cc96cc" xsi:nil="true"/>
+    <IntlLangReview xmlns="4873beb7-5857-4685-be1f-d57550cc96cc" xsi:nil="true"/>
+    <OutputCachingOn xmlns="4873beb7-5857-4685-be1f-d57550cc96cc">false</OutputCachingOn>
+    <AverageRating xmlns="4873beb7-5857-4685-be1f-d57550cc96cc" xsi:nil="true"/>
+    <APAuthor xmlns="4873beb7-5857-4685-be1f-d57550cc96cc">
+      <UserInfo>
+        <DisplayName>REDMOND\kristaa</DisplayName>
+        <AccountId>136</AccountId>
+        <AccountType/>
+      </UserInfo>
+    </APAuthor>
+    <LocManualTestRequired xmlns="4873beb7-5857-4685-be1f-d57550cc96cc">false</LocManualTestRequired>
+    <TPCommandLine xmlns="4873beb7-5857-4685-be1f-d57550cc96cc" xsi:nil="true"/>
+    <TPAppVersion xmlns="4873beb7-5857-4685-be1f-d57550cc96cc" xsi:nil="true"/>
+    <EditorialStatus xmlns="4873beb7-5857-4685-be1f-d57550cc96cc">Complete</EditorialStatus>
+    <LastModifiedDateTime xmlns="4873beb7-5857-4685-be1f-d57550cc96cc" xsi:nil="true"/>
+    <ScenarioTagsTaxHTField0 xmlns="4873beb7-5857-4685-be1f-d57550cc96cc">
+      <Terms xmlns="http://schemas.microsoft.com/office/infopath/2007/PartnerControls"/>
+    </ScenarioTagsTaxHTField0>
+    <LocProcessedForMarketsLookup xmlns="4873beb7-5857-4685-be1f-d57550cc96cc" xsi:nil="true"/>
+    <TPLaunchHelpLinkType xmlns="4873beb7-5857-4685-be1f-d57550cc96cc">Template</TPLaunchHelpLinkType>
+    <OriginalRelease xmlns="4873beb7-5857-4685-be1f-d57550cc96cc">15</OriginalRelease>
+    <LocalizationTagsTaxHTField0 xmlns="4873beb7-5857-4685-be1f-d57550cc96cc">
+      <Terms xmlns="http://schemas.microsoft.com/office/infopath/2007/PartnerControls"/>
+    </LocalizationTagsTaxHTField0>
+    <UACurrentWords xmlns="4873beb7-5857-4685-be1f-d57550cc96cc" xsi:nil="true"/>
+    <ArtSampleDocs xmlns="4873beb7-5857-4685-be1f-d57550cc96cc" xsi:nil="true"/>
+    <UALocRecommendation xmlns="4873beb7-5857-4685-be1f-d57550cc96cc">Localize</UALocRecommendation>
+    <Manager xmlns="4873beb7-5857-4685-be1f-d57550cc96cc" xsi:nil="true"/>
+    <LocOverallHandbackStatusLookup xmlns="4873beb7-5857-4685-be1f-d57550cc96cc" xsi:nil="true"/>
+    <ShowIn xmlns="4873beb7-5857-4685-be1f-d57550cc96cc">Show everywhere</ShowIn>
+    <UANotes xmlns="4873beb7-5857-4685-be1f-d57550cc96cc" xsi:nil="true"/>
+    <InternalTagsTaxHTField0 xmlns="4873beb7-5857-4685-be1f-d57550cc96cc">
+      <Terms xmlns="http://schemas.microsoft.com/office/infopath/2007/PartnerControls"/>
+    </InternalTagsTaxHTField0>
+    <CSXHash xmlns="4873beb7-5857-4685-be1f-d57550cc96cc" xsi:nil="true"/>
+    <VoteCount xmlns="4873beb7-5857-4685-be1f-d57550cc96cc" xsi:nil="true"/>
+    <AssetExpire xmlns="4873beb7-5857-4685-be1f-d57550cc96cc">2029-05-12T07:00:00+00:00</AssetExpire>
+    <DSATActionTaken xmlns="4873beb7-5857-4685-be1f-d57550cc96cc" xsi:nil="true"/>
+    <CSXSubmissionMarket xmlns="4873beb7-5857-4685-be1f-d57550cc96cc" xsi:nil="true"/>
+    <LocMarketGroupTiers2 xmlns="4873beb7-5857-4685-be1f-d57550cc96cc" xsi:nil="true"/>
+  </documentManagement>
+</p:properties>
 </file>
 
 <file path=customXml/itemProps1.xml><?xml version="1.0" encoding="utf-8"?>
-<ds:datastoreItem xmlns:ds="http://schemas.openxmlformats.org/officeDocument/2006/customXml" ds:itemID="{60C67BEE-D13F-4BD2-98A5-34D8A0977F68}">
+<ds:datastoreItem xmlns:ds="http://schemas.openxmlformats.org/officeDocument/2006/customXml" ds:itemID="{3836F65B-1B07-41EE-A0E8-BC6EF3855225}">
   <ds:schemaRefs>
-    <ds:schemaRef ds:uri="4873beb7-5857-4685-be1f-d57550cc96cc"/>
-    <ds:schemaRef ds:uri="http://schemas.microsoft.com/office/2006/documentManagement/types"/>
-    <ds:schemaRef ds:uri="http://purl.org/dc/dcmitype/"/>
-    <ds:schemaRef ds:uri="http://www.w3.org/XML/1998/namespace"/>
-    <ds:schemaRef ds:uri="http://purl.org/dc/terms/"/>
-    <ds:schemaRef ds:uri="http://schemas.openxmlformats.org/package/2006/metadata/core-properties"/>
-    <ds:schemaRef ds:uri="http://schemas.microsoft.com/office/infopath/2007/PartnerControls"/>
-    <ds:schemaRef ds:uri="http://schemas.microsoft.com/office/2006/metadata/properties"/>
-    <ds:schemaRef ds:uri="http://purl.org/dc/elements/1.1/"/>
+    <ds:schemaRef ds:uri="http://schemas.microsoft.com/sharepoint/v3/contenttype/forms"/>
   </ds:schemaRefs>
 </ds:datastoreItem>
 </file>
@@ -8168,9 +8282,17 @@
 </file>
 
 <file path=customXml/itemProps3.xml><?xml version="1.0" encoding="utf-8"?>
-<ds:datastoreItem xmlns:ds="http://schemas.openxmlformats.org/officeDocument/2006/customXml" ds:itemID="{3836F65B-1B07-41EE-A0E8-BC6EF3855225}">
+<ds:datastoreItem xmlns:ds="http://schemas.openxmlformats.org/officeDocument/2006/customXml" ds:itemID="{60C67BEE-D13F-4BD2-98A5-34D8A0977F68}">
   <ds:schemaRefs>
-    <ds:schemaRef ds:uri="http://schemas.microsoft.com/sharepoint/v3/contenttype/forms"/>
+    <ds:schemaRef ds:uri="4873beb7-5857-4685-be1f-d57550cc96cc"/>
+    <ds:schemaRef ds:uri="http://schemas.microsoft.com/office/2006/documentManagement/types"/>
+    <ds:schemaRef ds:uri="http://purl.org/dc/dcmitype/"/>
+    <ds:schemaRef ds:uri="http://www.w3.org/XML/1998/namespace"/>
+    <ds:schemaRef ds:uri="http://purl.org/dc/terms/"/>
+    <ds:schemaRef ds:uri="http://schemas.openxmlformats.org/package/2006/metadata/core-properties"/>
+    <ds:schemaRef ds:uri="http://schemas.microsoft.com/office/infopath/2007/PartnerControls"/>
+    <ds:schemaRef ds:uri="http://schemas.microsoft.com/office/2006/metadata/properties"/>
+    <ds:schemaRef ds:uri="http://purl.org/dc/elements/1.1/"/>
   </ds:schemaRefs>
 </ds:datastoreItem>
 </file>
</xml_diff>